<commit_message>
Corrected heatmap on trial permutation tables
</commit_message>
<xml_diff>
--- a/documents/posters/Chun_ABRCMS_2025_poster_final.pptx
+++ b/documents/posters/Chun_ABRCMS_2025_poster_final.pptx
@@ -252,11 +252,102 @@
 <file path=ppt/revisionInfo.xml><?xml version="1.0" encoding="utf-8"?>
 <p1510:revInfo xmlns:a="http://schemas.openxmlformats.org/drawingml/2006/main" xmlns:r="http://schemas.openxmlformats.org/officeDocument/2006/relationships" xmlns:p1510="http://schemas.microsoft.com/office/powerpoint/2015/10/main">
   <p1510:revLst>
-    <p1510:client id="{4B816A45-D898-4102-B558-A558CE018C5D}" v="11" dt="2025-11-11T22:42:09.080"/>
-    <p1510:client id="{C671A4F4-83E6-446A-83B6-63A4DF704766}" v="3" dt="2025-11-11T21:55:09.218"/>
-    <p1510:client id="{FB9F5B54-6879-46D1-85A9-EC72C30D7AF1}" v="24" dt="2025-11-11T21:39:16.915"/>
+    <p1510:client id="{9DE4DDE9-A0FC-4963-BA87-4AAB435ADD81}" v="2" dt="2025-11-25T22:01:32.429"/>
   </p1510:revLst>
 </p1510:revInfo>
+</file>
+
+<file path=ppt/changesInfos/changesInfo1.xml><?xml version="1.0" encoding="utf-8"?>
+<pc:chgInfo xmlns:a="http://schemas.openxmlformats.org/drawingml/2006/main" xmlns:r="http://schemas.openxmlformats.org/officeDocument/2006/relationships" xmlns:ac="http://schemas.microsoft.com/office/drawing/2013/main/command" xmlns:pc="http://schemas.microsoft.com/office/powerpoint/2013/main/command">
+  <pc:docChgLst>
+    <pc:chgData name="Chun, Nikki" userId="23a9dea9-b5fb-4c75-a250-ed91f1fe31cc" providerId="ADAL" clId="{B50FFF0B-326B-42F0-9248-1661B3D3AD02}"/>
+    <pc:docChg chg="undo custSel modSld">
+      <pc:chgData name="Chun, Nikki" userId="23a9dea9-b5fb-4c75-a250-ed91f1fe31cc" providerId="ADAL" clId="{B50FFF0B-326B-42F0-9248-1661B3D3AD02}" dt="2025-11-25T22:05:29.196" v="188" actId="20577"/>
+      <pc:docMkLst>
+        <pc:docMk/>
+      </pc:docMkLst>
+      <pc:sldChg chg="addSp delSp modSp mod">
+        <pc:chgData name="Chun, Nikki" userId="23a9dea9-b5fb-4c75-a250-ed91f1fe31cc" providerId="ADAL" clId="{B50FFF0B-326B-42F0-9248-1661B3D3AD02}" dt="2025-11-25T22:05:29.196" v="188" actId="20577"/>
+        <pc:sldMkLst>
+          <pc:docMk/>
+          <pc:sldMk cId="2166200899" sldId="257"/>
+        </pc:sldMkLst>
+        <pc:spChg chg="mod">
+          <ac:chgData name="Chun, Nikki" userId="23a9dea9-b5fb-4c75-a250-ed91f1fe31cc" providerId="ADAL" clId="{B50FFF0B-326B-42F0-9248-1661B3D3AD02}" dt="2025-11-25T22:03:41.835" v="185" actId="20577"/>
+          <ac:spMkLst>
+            <pc:docMk/>
+            <pc:sldMk cId="2166200899" sldId="257"/>
+            <ac:spMk id="157" creationId="{59DC1CC9-8997-633E-01E2-0ECF6AE6522F}"/>
+          </ac:spMkLst>
+        </pc:spChg>
+        <pc:spChg chg="mod">
+          <ac:chgData name="Chun, Nikki" userId="23a9dea9-b5fb-4c75-a250-ed91f1fe31cc" providerId="ADAL" clId="{B50FFF0B-326B-42F0-9248-1661B3D3AD02}" dt="2025-11-25T22:05:29.196" v="188" actId="20577"/>
+          <ac:spMkLst>
+            <pc:docMk/>
+            <pc:sldMk cId="2166200899" sldId="257"/>
+            <ac:spMk id="158" creationId="{D0C108DA-C031-A5C1-D389-EF30957D7A49}"/>
+          </ac:spMkLst>
+        </pc:spChg>
+        <pc:graphicFrameChg chg="modGraphic">
+          <ac:chgData name="Chun, Nikki" userId="23a9dea9-b5fb-4c75-a250-ed91f1fe31cc" providerId="ADAL" clId="{B50FFF0B-326B-42F0-9248-1661B3D3AD02}" dt="2025-11-25T22:05:19.465" v="186" actId="20577"/>
+          <ac:graphicFrameMkLst>
+            <pc:docMk/>
+            <pc:sldMk cId="2166200899" sldId="257"/>
+            <ac:graphicFrameMk id="9" creationId="{EB47D305-A839-7A33-2B12-08B8EA2A00E9}"/>
+          </ac:graphicFrameMkLst>
+        </pc:graphicFrameChg>
+        <pc:graphicFrameChg chg="modGraphic">
+          <ac:chgData name="Chun, Nikki" userId="23a9dea9-b5fb-4c75-a250-ed91f1fe31cc" providerId="ADAL" clId="{B50FFF0B-326B-42F0-9248-1661B3D3AD02}" dt="2025-11-25T22:00:30.601" v="10" actId="207"/>
+          <ac:graphicFrameMkLst>
+            <pc:docMk/>
+            <pc:sldMk cId="2166200899" sldId="257"/>
+            <ac:graphicFrameMk id="58" creationId="{C3526A7B-49DA-5A8A-0DAB-FAE4C8D0400F}"/>
+          </ac:graphicFrameMkLst>
+        </pc:graphicFrameChg>
+        <pc:graphicFrameChg chg="modGraphic">
+          <ac:chgData name="Chun, Nikki" userId="23a9dea9-b5fb-4c75-a250-ed91f1fe31cc" providerId="ADAL" clId="{B50FFF0B-326B-42F0-9248-1661B3D3AD02}" dt="2025-11-25T22:01:20.423" v="19" actId="207"/>
+          <ac:graphicFrameMkLst>
+            <pc:docMk/>
+            <pc:sldMk cId="2166200899" sldId="257"/>
+            <ac:graphicFrameMk id="74" creationId="{D214E707-C351-F1B9-0968-0942E18F42E3}"/>
+          </ac:graphicFrameMkLst>
+        </pc:graphicFrameChg>
+        <pc:graphicFrameChg chg="modGraphic">
+          <ac:chgData name="Chun, Nikki" userId="23a9dea9-b5fb-4c75-a250-ed91f1fe31cc" providerId="ADAL" clId="{B50FFF0B-326B-42F0-9248-1661B3D3AD02}" dt="2025-11-25T22:02:31.526" v="169" actId="207"/>
+          <ac:graphicFrameMkLst>
+            <pc:docMk/>
+            <pc:sldMk cId="2166200899" sldId="257"/>
+            <ac:graphicFrameMk id="75" creationId="{CC3A1838-D8FD-6284-B986-96A538791656}"/>
+          </ac:graphicFrameMkLst>
+        </pc:graphicFrameChg>
+        <pc:graphicFrameChg chg="modGraphic">
+          <ac:chgData name="Chun, Nikki" userId="23a9dea9-b5fb-4c75-a250-ed91f1fe31cc" providerId="ADAL" clId="{B50FFF0B-326B-42F0-9248-1661B3D3AD02}" dt="2025-11-25T22:03:13.547" v="178" actId="20577"/>
+          <ac:graphicFrameMkLst>
+            <pc:docMk/>
+            <pc:sldMk cId="2166200899" sldId="257"/>
+            <ac:graphicFrameMk id="76" creationId="{038E8340-652F-8854-BF5F-E97C67AA6B0C}"/>
+          </ac:graphicFrameMkLst>
+        </pc:graphicFrameChg>
+        <pc:picChg chg="add del mod">
+          <ac:chgData name="Chun, Nikki" userId="23a9dea9-b5fb-4c75-a250-ed91f1fe31cc" providerId="ADAL" clId="{B50FFF0B-326B-42F0-9248-1661B3D3AD02}" dt="2025-11-25T22:01:22.973" v="20" actId="478"/>
+          <ac:picMkLst>
+            <pc:docMk/>
+            <pc:sldMk cId="2166200899" sldId="257"/>
+            <ac:picMk id="6" creationId="{FE67DD1D-56B3-8AE1-8599-D779D82B0EE6}"/>
+          </ac:picMkLst>
+        </pc:picChg>
+        <pc:picChg chg="add del mod">
+          <ac:chgData name="Chun, Nikki" userId="23a9dea9-b5fb-4c75-a250-ed91f1fe31cc" providerId="ADAL" clId="{B50FFF0B-326B-42F0-9248-1661B3D3AD02}" dt="2025-11-25T22:03:15.621" v="179" actId="478"/>
+          <ac:picMkLst>
+            <pc:docMk/>
+            <pc:sldMk cId="2166200899" sldId="257"/>
+            <ac:picMk id="100" creationId="{92546E3A-6D2A-2952-AE32-1E320067386E}"/>
+          </ac:picMkLst>
+        </pc:picChg>
+      </pc:sldChg>
+    </pc:docChg>
+  </pc:docChgLst>
+</pc:chgInfo>
 </file>
 
 <file path=ppt/charts/chart1.xml><?xml version="1.0" encoding="utf-8"?>
@@ -17447,7 +17538,7 @@
                   <a:ea typeface="Sans Serif Collection" panose="020B0502040504020204" pitchFamily="34" charset="0"/>
                   <a:cs typeface="Sans Serif Collection" panose="020B0502040504020204" pitchFamily="34" charset="0"/>
                 </a:rPr>
-                <a:t>b</a:t>
+                <a:t>P</a:t>
               </a:r>
               <a:r>
                 <a:rPr lang="en-US" sz="2000" dirty="0">
@@ -17481,7 +17572,7 @@
                   <a:ea typeface="Sans Serif Collection" panose="020B0502040504020204" pitchFamily="34" charset="0"/>
                   <a:cs typeface="Sans Serif Collection" panose="020B0502040504020204" pitchFamily="34" charset="0"/>
                 </a:rPr>
-                <a:t>P</a:t>
+                <a:t>b</a:t>
               </a:r>
               <a:r>
                 <a:rPr lang="en-US" sz="2000" dirty="0">
@@ -17570,7 +17661,7 @@
                   <a:ea typeface="Sans Serif Collection" panose="020B0502040504020204" pitchFamily="34" charset="0"/>
                   <a:cs typeface="Sans Serif Collection" panose="020B0502040504020204" pitchFamily="34" charset="0"/>
                 </a:rPr>
-                <a:t>b</a:t>
+                <a:t>P</a:t>
               </a:r>
               <a:r>
                 <a:rPr lang="en-US" sz="2000" dirty="0">
@@ -21515,7 +21606,7 @@
           <p:nvPr>
             <p:extLst>
               <p:ext uri="{D42A27DB-BD31-4B8C-83A1-F6EECF244321}">
-                <p14:modId xmlns:p14="http://schemas.microsoft.com/office/powerpoint/2010/main" val="895778336"/>
+                <p14:modId xmlns:p14="http://schemas.microsoft.com/office/powerpoint/2010/main" val="3464969610"/>
               </p:ext>
             </p:extLst>
           </p:nvPr>
@@ -21801,7 +21892,7 @@
                   </a:txBody>
                   <a:tcPr>
                     <a:solidFill>
-                      <a:srgbClr val="B0E29D"/>
+                      <a:srgbClr val="D4EDC9"/>
                     </a:solidFill>
                   </a:tcPr>
                 </a:tc>
@@ -21880,7 +21971,7 @@
                   </a:txBody>
                   <a:tcPr>
                     <a:solidFill>
-                      <a:srgbClr val="AFE19C"/>
+                      <a:srgbClr val="D2ECC8"/>
                     </a:solidFill>
                   </a:tcPr>
                 </a:tc>
@@ -21959,7 +22050,7 @@
                   </a:txBody>
                   <a:tcPr>
                     <a:solidFill>
-                      <a:srgbClr val="B4E5A1"/>
+                      <a:srgbClr val="D9F1CE"/>
                     </a:solidFill>
                   </a:tcPr>
                 </a:tc>
@@ -22038,7 +22129,7 @@
                   </a:txBody>
                   <a:tcPr>
                     <a:solidFill>
-                      <a:srgbClr val="B2E39E"/>
+                      <a:srgbClr val="D5EFCB"/>
                     </a:solidFill>
                   </a:tcPr>
                 </a:tc>
@@ -22115,7 +22206,7 @@
           <p:nvPr>
             <p:extLst>
               <p:ext uri="{D42A27DB-BD31-4B8C-83A1-F6EECF244321}">
-                <p14:modId xmlns:p14="http://schemas.microsoft.com/office/powerpoint/2010/main" val="525821064"/>
+                <p14:modId xmlns:p14="http://schemas.microsoft.com/office/powerpoint/2010/main" val="2592682008"/>
               </p:ext>
             </p:extLst>
           </p:nvPr>
@@ -22429,7 +22520,7 @@
                   </a:txBody>
                   <a:tcPr>
                     <a:solidFill>
-                      <a:srgbClr val="95CA80"/>
+                      <a:srgbClr val="B0D3A1"/>
                     </a:solidFill>
                   </a:tcPr>
                 </a:tc>
@@ -22523,7 +22614,7 @@
                   </a:txBody>
                   <a:tcPr>
                     <a:solidFill>
-                      <a:srgbClr val="A4D890"/>
+                      <a:srgbClr val="C4E2B8"/>
                     </a:solidFill>
                   </a:tcPr>
                 </a:tc>
@@ -22595,7 +22686,7 @@
                   </a:txBody>
                   <a:tcPr>
                     <a:solidFill>
-                      <a:srgbClr val="DAF3D1"/>
+                      <a:srgbClr val="F5FCF2"/>
                     </a:solidFill>
                   </a:tcPr>
                 </a:tc>
@@ -22616,7 +22707,7 @@
                   </a:txBody>
                   <a:tcPr>
                     <a:solidFill>
-                      <a:srgbClr val="81B96B"/>
+                      <a:srgbClr val="96C086"/>
                     </a:solidFill>
                   </a:tcPr>
                 </a:tc>
@@ -22688,7 +22779,7 @@
                   </a:txBody>
                   <a:tcPr>
                     <a:solidFill>
-                      <a:srgbClr val="B5E6A2"/>
+                      <a:srgbClr val="E0F4D7"/>
                     </a:solidFill>
                   </a:tcPr>
                 </a:tc>
@@ -22738,7 +22829,7 @@
           <p:nvPr>
             <p:extLst>
               <p:ext uri="{D42A27DB-BD31-4B8C-83A1-F6EECF244321}">
-                <p14:modId xmlns:p14="http://schemas.microsoft.com/office/powerpoint/2010/main" val="1521584724"/>
+                <p14:modId xmlns:p14="http://schemas.microsoft.com/office/powerpoint/2010/main" val="458737102"/>
               </p:ext>
             </p:extLst>
           </p:nvPr>
@@ -23024,7 +23115,7 @@
                   </a:txBody>
                   <a:tcPr>
                     <a:solidFill>
-                      <a:srgbClr val="B2E49F"/>
+                      <a:srgbClr val="DAF2CF"/>
                     </a:solidFill>
                   </a:tcPr>
                 </a:tc>
@@ -23086,7 +23177,7 @@
                   </a:txBody>
                   <a:tcPr>
                     <a:solidFill>
-                      <a:srgbClr val="F1FBEE"/>
+                      <a:srgbClr val="F5FCF2"/>
                     </a:solidFill>
                   </a:tcPr>
                 </a:tc>
@@ -23107,7 +23198,7 @@
                   </a:txBody>
                   <a:tcPr>
                     <a:solidFill>
-                      <a:srgbClr val="639F4B"/>
+                      <a:srgbClr val="C0DFB3"/>
                     </a:solidFill>
                   </a:tcPr>
                 </a:tc>
@@ -23186,7 +23277,7 @@
                   </a:txBody>
                   <a:tcPr>
                     <a:solidFill>
-                      <a:srgbClr val="8FC57A"/>
+                      <a:srgbClr val="CEE9C3"/>
                     </a:solidFill>
                   </a:tcPr>
                 </a:tc>
@@ -23265,7 +23356,7 @@
                   </a:txBody>
                   <a:tcPr>
                     <a:solidFill>
-                      <a:srgbClr val="A3D78F"/>
+                      <a:srgbClr val="D5EECA"/>
                     </a:solidFill>
                   </a:tcPr>
                 </a:tc>
@@ -23294,7 +23385,7 @@
           <p:nvPr>
             <p:extLst>
               <p:ext uri="{D42A27DB-BD31-4B8C-83A1-F6EECF244321}">
-                <p14:modId xmlns:p14="http://schemas.microsoft.com/office/powerpoint/2010/main" val="381268587"/>
+                <p14:modId xmlns:p14="http://schemas.microsoft.com/office/powerpoint/2010/main" val="1151951087"/>
               </p:ext>
             </p:extLst>
           </p:nvPr>
@@ -23588,7 +23679,7 @@
                   </a:txBody>
                   <a:tcPr>
                     <a:solidFill>
-                      <a:srgbClr val="519038"/>
+                      <a:srgbClr val="BADBAD"/>
                     </a:solidFill>
                   </a:tcPr>
                 </a:tc>
@@ -23650,7 +23741,7 @@
                   </a:txBody>
                   <a:tcPr>
                     <a:solidFill>
-                      <a:srgbClr val="B5E6A2"/>
+                      <a:srgbClr val="DAF2D0"/>
                     </a:solidFill>
                   </a:tcPr>
                 </a:tc>
@@ -23671,7 +23762,7 @@
                   </a:txBody>
                   <a:tcPr>
                     <a:solidFill>
-                      <a:srgbClr val="428228"/>
+                      <a:srgbClr val="B6D7A8"/>
                     </a:solidFill>
                   </a:tcPr>
                 </a:tc>
@@ -23733,7 +23824,7 @@
                   </a:txBody>
                   <a:tcPr>
                     <a:solidFill>
-                      <a:srgbClr val="CAEDBC"/>
+                      <a:srgbClr val="DAF2D0"/>
                     </a:solidFill>
                   </a:tcPr>
                 </a:tc>
@@ -23754,7 +23845,7 @@
                   </a:txBody>
                   <a:tcPr>
                     <a:solidFill>
-                      <a:srgbClr val="3C7D22"/>
+                      <a:srgbClr val="B4D6A6"/>
                     </a:solidFill>
                   </a:tcPr>
                 </a:tc>
@@ -23833,7 +23924,7 @@
                   </a:txBody>
                   <a:tcPr>
                     <a:solidFill>
-                      <a:srgbClr val="77B060"/>
+                      <a:srgbClr val="C7E4BA"/>
                     </a:solidFill>
                   </a:tcPr>
                 </a:tc>
@@ -26049,7 +26140,7 @@
           <p:nvPr>
             <p:extLst>
               <p:ext uri="{D42A27DB-BD31-4B8C-83A1-F6EECF244321}">
-                <p14:modId xmlns:p14="http://schemas.microsoft.com/office/powerpoint/2010/main" val="1656199339"/>
+                <p14:modId xmlns:p14="http://schemas.microsoft.com/office/powerpoint/2010/main" val="2575890803"/>
               </p:ext>
             </p:extLst>
           </p:nvPr>
@@ -26449,7 +26540,7 @@
                           <a:ea typeface="Sans Serif Collection" panose="020B0502040504020204" pitchFamily="34" charset="0"/>
                           <a:cs typeface="Sans Serif Collection" panose="020B0502040504020204" pitchFamily="34" charset="0"/>
                         </a:rPr>
-                        <a:t>P</a:t>
+                        <a:t>P </a:t>
                       </a:r>
                       <a:r>
                         <a:rPr lang="en-US" sz="2000" b="1" u="none" strike="noStrike" dirty="0">
@@ -29917,12 +30008,11 @@
 </file>
 
 <file path=customXml/item1.xml><?xml version="1.0" encoding="utf-8"?>
-<?mso-contentType ?>
-<FormTemplates xmlns="http://schemas.microsoft.com/sharepoint/v3/contenttype/forms">
-  <Display>DocumentLibraryForm</Display>
-  <Edit>DocumentLibraryForm</Edit>
-  <New>DocumentLibraryForm</New>
-</FormTemplates>
+<p:properties xmlns:p="http://schemas.microsoft.com/office/2006/metadata/properties" xmlns:xsi="http://www.w3.org/2001/XMLSchema-instance" xmlns:pc="http://schemas.microsoft.com/office/infopath/2007/PartnerControls">
+  <documentManagement>
+    <_activity xmlns="070f1269-45c1-4463-99ba-5dc4e57c7dff" xsi:nil="true"/>
+  </documentManagement>
+</p:properties>
 </file>
 
 <file path=customXml/item2.xml><?xml version="1.0" encoding="utf-8"?>
@@ -30159,17 +30249,27 @@
 </file>
 
 <file path=customXml/item3.xml><?xml version="1.0" encoding="utf-8"?>
-<p:properties xmlns:p="http://schemas.microsoft.com/office/2006/metadata/properties" xmlns:xsi="http://www.w3.org/2001/XMLSchema-instance" xmlns:pc="http://schemas.microsoft.com/office/infopath/2007/PartnerControls">
-  <documentManagement>
-    <_activity xmlns="070f1269-45c1-4463-99ba-5dc4e57c7dff" xsi:nil="true"/>
-  </documentManagement>
-</p:properties>
+<?mso-contentType ?>
+<FormTemplates xmlns="http://schemas.microsoft.com/sharepoint/v3/contenttype/forms">
+  <Display>DocumentLibraryForm</Display>
+  <Edit>DocumentLibraryForm</Edit>
+  <New>DocumentLibraryForm</New>
+</FormTemplates>
 </file>
 
 <file path=customXml/itemProps1.xml><?xml version="1.0" encoding="utf-8"?>
-<ds:datastoreItem xmlns:ds="http://schemas.openxmlformats.org/officeDocument/2006/customXml" ds:itemID="{F3279A08-9DEC-424B-A25F-C1670C2EBD72}">
+<ds:datastoreItem xmlns:ds="http://schemas.openxmlformats.org/officeDocument/2006/customXml" ds:itemID="{D829B5F7-37D9-4900-8E22-180F32838EE0}">
   <ds:schemaRefs>
-    <ds:schemaRef ds:uri="http://schemas.microsoft.com/sharepoint/v3/contenttype/forms"/>
+    <ds:schemaRef ds:uri="070f1269-45c1-4463-99ba-5dc4e57c7dff"/>
+    <ds:schemaRef ds:uri="http://schemas.openxmlformats.org/package/2006/metadata/core-properties"/>
+    <ds:schemaRef ds:uri="http://schemas.microsoft.com/office/2006/documentManagement/types"/>
+    <ds:schemaRef ds:uri="http://www.w3.org/XML/1998/namespace"/>
+    <ds:schemaRef ds:uri="http://purl.org/dc/dcmitype/"/>
+    <ds:schemaRef ds:uri="http://schemas.microsoft.com/office/2006/metadata/properties"/>
+    <ds:schemaRef ds:uri="http://purl.org/dc/terms/"/>
+    <ds:schemaRef ds:uri="http://schemas.microsoft.com/office/infopath/2007/PartnerControls"/>
+    <ds:schemaRef ds:uri="7bf50b4b-6300-445a-aea1-306a2291592c"/>
+    <ds:schemaRef ds:uri="http://purl.org/dc/elements/1.1/"/>
   </ds:schemaRefs>
 </ds:datastoreItem>
 </file>
@@ -30194,18 +30294,9 @@
 </file>
 
 <file path=customXml/itemProps3.xml><?xml version="1.0" encoding="utf-8"?>
-<ds:datastoreItem xmlns:ds="http://schemas.openxmlformats.org/officeDocument/2006/customXml" ds:itemID="{D829B5F7-37D9-4900-8E22-180F32838EE0}">
+<ds:datastoreItem xmlns:ds="http://schemas.openxmlformats.org/officeDocument/2006/customXml" ds:itemID="{F3279A08-9DEC-424B-A25F-C1670C2EBD72}">
   <ds:schemaRefs>
-    <ds:schemaRef ds:uri="070f1269-45c1-4463-99ba-5dc4e57c7dff"/>
-    <ds:schemaRef ds:uri="http://schemas.openxmlformats.org/package/2006/metadata/core-properties"/>
-    <ds:schemaRef ds:uri="http://schemas.microsoft.com/office/2006/documentManagement/types"/>
-    <ds:schemaRef ds:uri="http://www.w3.org/XML/1998/namespace"/>
-    <ds:schemaRef ds:uri="http://purl.org/dc/dcmitype/"/>
-    <ds:schemaRef ds:uri="http://schemas.microsoft.com/office/2006/metadata/properties"/>
-    <ds:schemaRef ds:uri="http://purl.org/dc/terms/"/>
-    <ds:schemaRef ds:uri="http://schemas.microsoft.com/office/infopath/2007/PartnerControls"/>
-    <ds:schemaRef ds:uri="7bf50b4b-6300-445a-aea1-306a2291592c"/>
-    <ds:schemaRef ds:uri="http://purl.org/dc/elements/1.1/"/>
+    <ds:schemaRef ds:uri="http://schemas.microsoft.com/sharepoint/v3/contenttype/forms"/>
   </ds:schemaRefs>
 </ds:datastoreItem>
 </file>
</xml_diff>